<commit_message>
add ESC mix doc
</commit_message>
<xml_diff>
--- a/libraries/Diagramm Drone.pptx
+++ b/libraries/Diagramm Drone.pptx
@@ -292,7 +292,7 @@
           <a:p>
             <a:fld id="{0717AEF8-1597-4679-8926-916E82E12B07}" type="datetimeFigureOut">
               <a:rPr lang="fr-FR" smtClean="0"/>
-              <a:t>25/03/2019</a:t>
+              <a:t>26/03/2019</a:t>
             </a:fld>
             <a:endParaRPr lang="fr-FR"/>
           </a:p>
@@ -490,7 +490,7 @@
           <a:p>
             <a:fld id="{0717AEF8-1597-4679-8926-916E82E12B07}" type="datetimeFigureOut">
               <a:rPr lang="fr-FR" smtClean="0"/>
-              <a:t>25/03/2019</a:t>
+              <a:t>26/03/2019</a:t>
             </a:fld>
             <a:endParaRPr lang="fr-FR"/>
           </a:p>
@@ -698,7 +698,7 @@
           <a:p>
             <a:fld id="{0717AEF8-1597-4679-8926-916E82E12B07}" type="datetimeFigureOut">
               <a:rPr lang="fr-FR" smtClean="0"/>
-              <a:t>25/03/2019</a:t>
+              <a:t>26/03/2019</a:t>
             </a:fld>
             <a:endParaRPr lang="fr-FR"/>
           </a:p>
@@ -896,7 +896,7 @@
           <a:p>
             <a:fld id="{0717AEF8-1597-4679-8926-916E82E12B07}" type="datetimeFigureOut">
               <a:rPr lang="fr-FR" smtClean="0"/>
-              <a:t>25/03/2019</a:t>
+              <a:t>26/03/2019</a:t>
             </a:fld>
             <a:endParaRPr lang="fr-FR"/>
           </a:p>
@@ -1171,7 +1171,7 @@
           <a:p>
             <a:fld id="{0717AEF8-1597-4679-8926-916E82E12B07}" type="datetimeFigureOut">
               <a:rPr lang="fr-FR" smtClean="0"/>
-              <a:t>25/03/2019</a:t>
+              <a:t>26/03/2019</a:t>
             </a:fld>
             <a:endParaRPr lang="fr-FR"/>
           </a:p>
@@ -1436,7 +1436,7 @@
           <a:p>
             <a:fld id="{0717AEF8-1597-4679-8926-916E82E12B07}" type="datetimeFigureOut">
               <a:rPr lang="fr-FR" smtClean="0"/>
-              <a:t>25/03/2019</a:t>
+              <a:t>26/03/2019</a:t>
             </a:fld>
             <a:endParaRPr lang="fr-FR"/>
           </a:p>
@@ -1848,7 +1848,7 @@
           <a:p>
             <a:fld id="{0717AEF8-1597-4679-8926-916E82E12B07}" type="datetimeFigureOut">
               <a:rPr lang="fr-FR" smtClean="0"/>
-              <a:t>25/03/2019</a:t>
+              <a:t>26/03/2019</a:t>
             </a:fld>
             <a:endParaRPr lang="fr-FR"/>
           </a:p>
@@ -1989,7 +1989,7 @@
           <a:p>
             <a:fld id="{0717AEF8-1597-4679-8926-916E82E12B07}" type="datetimeFigureOut">
               <a:rPr lang="fr-FR" smtClean="0"/>
-              <a:t>25/03/2019</a:t>
+              <a:t>26/03/2019</a:t>
             </a:fld>
             <a:endParaRPr lang="fr-FR"/>
           </a:p>
@@ -2102,7 +2102,7 @@
           <a:p>
             <a:fld id="{0717AEF8-1597-4679-8926-916E82E12B07}" type="datetimeFigureOut">
               <a:rPr lang="fr-FR" smtClean="0"/>
-              <a:t>25/03/2019</a:t>
+              <a:t>26/03/2019</a:t>
             </a:fld>
             <a:endParaRPr lang="fr-FR"/>
           </a:p>
@@ -2413,7 +2413,7 @@
           <a:p>
             <a:fld id="{0717AEF8-1597-4679-8926-916E82E12B07}" type="datetimeFigureOut">
               <a:rPr lang="fr-FR" smtClean="0"/>
-              <a:t>25/03/2019</a:t>
+              <a:t>26/03/2019</a:t>
             </a:fld>
             <a:endParaRPr lang="fr-FR"/>
           </a:p>
@@ -2701,7 +2701,7 @@
           <a:p>
             <a:fld id="{0717AEF8-1597-4679-8926-916E82E12B07}" type="datetimeFigureOut">
               <a:rPr lang="fr-FR" smtClean="0"/>
-              <a:t>25/03/2019</a:t>
+              <a:t>26/03/2019</a:t>
             </a:fld>
             <a:endParaRPr lang="fr-FR"/>
           </a:p>
@@ -2942,7 +2942,7 @@
           <a:p>
             <a:fld id="{0717AEF8-1597-4679-8926-916E82E12B07}" type="datetimeFigureOut">
               <a:rPr lang="fr-FR" smtClean="0"/>
-              <a:t>25/03/2019</a:t>
+              <a:t>26/03/2019</a:t>
             </a:fld>
             <a:endParaRPr lang="fr-FR"/>
           </a:p>
@@ -10730,7 +10730,7 @@
         <p:spPr>
           <a:xfrm>
             <a:off x="6633100" y="3570654"/>
-            <a:ext cx="934936" cy="369332"/>
+            <a:ext cx="1390189" cy="923330"/>
           </a:xfrm>
           <a:prstGeom prst="rect">
             <a:avLst/>
@@ -10748,6 +10748,18 @@
               <a:t>+90 Roll</a:t>
             </a:r>
           </a:p>
+          <a:p>
+            <a:r>
+              <a:rPr lang="en-US" dirty="0"/>
+              <a:t>+ Front Right</a:t>
+            </a:r>
+          </a:p>
+          <a:p>
+            <a:r>
+              <a:rPr lang="en-US" dirty="0"/>
+              <a:t>+ Rear Right</a:t>
+            </a:r>
+          </a:p>
         </p:txBody>
       </p:sp>
       <p:sp>
@@ -10765,7 +10777,7 @@
         <p:spPr>
           <a:xfrm>
             <a:off x="10947953" y="3500995"/>
-            <a:ext cx="890052" cy="369332"/>
+            <a:ext cx="1212320" cy="923330"/>
           </a:xfrm>
           <a:prstGeom prst="rect">
             <a:avLst/>
@@ -10783,6 +10795,18 @@
               <a:t>-90 Roll</a:t>
             </a:r>
           </a:p>
+          <a:p>
+            <a:r>
+              <a:rPr lang="en-US" dirty="0"/>
+              <a:t>+Front Left</a:t>
+            </a:r>
+          </a:p>
+          <a:p>
+            <a:r>
+              <a:rPr lang="en-US" dirty="0"/>
+              <a:t>+ Rear Left</a:t>
+            </a:r>
+          </a:p>
         </p:txBody>
       </p:sp>
       <p:sp>
@@ -10870,7 +10894,7 @@
         <p:spPr>
           <a:xfrm>
             <a:off x="2856818" y="5862849"/>
-            <a:ext cx="1007392" cy="369332"/>
+            <a:ext cx="1263744" cy="923330"/>
           </a:xfrm>
           <a:prstGeom prst="rect">
             <a:avLst/>
@@ -10888,6 +10912,18 @@
               <a:t>-90 Pitch</a:t>
             </a:r>
           </a:p>
+          <a:p>
+            <a:r>
+              <a:rPr lang="en-US" dirty="0"/>
+              <a:t>+Rear Right</a:t>
+            </a:r>
+          </a:p>
+          <a:p>
+            <a:r>
+              <a:rPr lang="en-US" dirty="0"/>
+              <a:t>+ Rear Left</a:t>
+            </a:r>
+          </a:p>
         </p:txBody>
       </p:sp>
       <p:sp>
@@ -10905,7 +10941,7 @@
         <p:spPr>
           <a:xfrm>
             <a:off x="2798326" y="1162623"/>
-            <a:ext cx="1052276" cy="369332"/>
+            <a:ext cx="1390189" cy="1200329"/>
           </a:xfrm>
           <a:prstGeom prst="rect">
             <a:avLst/>
@@ -10923,6 +10959,21 @@
               <a:t>+90 Pitch</a:t>
             </a:r>
           </a:p>
+          <a:p>
+            <a:r>
+              <a:rPr lang="en-US" dirty="0"/>
+              <a:t>+ Front Left</a:t>
+            </a:r>
+          </a:p>
+          <a:p>
+            <a:r>
+              <a:rPr lang="en-US" dirty="0"/>
+              <a:t>+ Front Right</a:t>
+            </a:r>
+          </a:p>
+          <a:p>
+            <a:endParaRPr lang="en-US" dirty="0"/>
+          </a:p>
         </p:txBody>
       </p:sp>
       <p:sp>
@@ -11023,8 +11074,8 @@
         </p:blipFill>
         <p:spPr>
           <a:xfrm>
-            <a:off x="3929059" y="882237"/>
-            <a:ext cx="4541520" cy="2580925"/>
+            <a:off x="4218914" y="882237"/>
+            <a:ext cx="4109622" cy="2580925"/>
           </a:xfrm>
           <a:prstGeom prst="rect">
             <a:avLst/>
@@ -15669,7 +15720,7 @@
         <p:spPr/>
         <p:txBody>
           <a:bodyPr>
-            <a:normAutofit fontScale="92500" lnSpcReduction="20000"/>
+            <a:normAutofit fontScale="55000" lnSpcReduction="20000"/>
           </a:bodyPr>
           <a:lstStyle/>
           <a:p>
@@ -15741,6 +15792,85 @@
             <a:r>
               <a:rPr lang="en-US" dirty="0"/>
               <a:t> - Counter clockwise, speed Front Right &amp; Rear Left, slow Front Left &amp; Rear Right</a:t>
+            </a:r>
+          </a:p>
+          <a:p>
+            <a:pPr lvl="1"/>
+            <a:endParaRPr lang="en-US" dirty="0"/>
+          </a:p>
+          <a:p>
+            <a:r>
+              <a:rPr lang="en-US" dirty="0"/>
+              <a:t>Mix result. </a:t>
+            </a:r>
+          </a:p>
+          <a:p>
+            <a:pPr marL="457200" lvl="1" indent="0">
+              <a:buNone/>
+            </a:pPr>
+            <a:r>
+              <a:rPr lang="en-US" dirty="0"/>
+              <a:t>#define PIDMIX(X,Y,Z) </a:t>
+            </a:r>
+            <a:r>
+              <a:rPr lang="en-US" dirty="0" err="1"/>
+              <a:t>ESC_command</a:t>
+            </a:r>
+            <a:r>
+              <a:rPr lang="en-US" dirty="0"/>
+              <a:t>[ROLL]*X + </a:t>
+            </a:r>
+            <a:r>
+              <a:rPr lang="en-US" dirty="0" err="1"/>
+              <a:t>ESC_command</a:t>
+            </a:r>
+            <a:r>
+              <a:rPr lang="en-US" dirty="0"/>
+              <a:t>[PITCH]*Y + </a:t>
+            </a:r>
+            <a:r>
+              <a:rPr lang="en-US" dirty="0" err="1"/>
+              <a:t>ESC_command</a:t>
+            </a:r>
+            <a:r>
+              <a:rPr lang="en-US" dirty="0"/>
+              <a:t>[YAW</a:t>
+            </a:r>
+          </a:p>
+          <a:p>
+            <a:pPr marL="457200" lvl="1" indent="0">
+              <a:buNone/>
+            </a:pPr>
+            <a:r>
+              <a:rPr lang="en-US" dirty="0"/>
+              <a:t>motor[0] = PIDMIX(-1,+1,+1); //Front Left</a:t>
+            </a:r>
+          </a:p>
+          <a:p>
+            <a:pPr marL="457200" lvl="1" indent="0">
+              <a:buNone/>
+            </a:pPr>
+            <a:r>
+              <a:rPr lang="en-US" dirty="0"/>
+              <a:t>motor[1] = PIDMIX(+1,+1,-1); //Front Right</a:t>
+            </a:r>
+          </a:p>
+          <a:p>
+            <a:pPr marL="457200" lvl="1" indent="0">
+              <a:buNone/>
+            </a:pPr>
+            <a:r>
+              <a:rPr lang="en-US" dirty="0"/>
+              <a:t>motor[2] = PIDMIX(+1,-1,+1); //Rear Right</a:t>
+            </a:r>
+          </a:p>
+          <a:p>
+            <a:pPr marL="457200" lvl="1" indent="0">
+              <a:buNone/>
+            </a:pPr>
+            <a:r>
+              <a:rPr lang="en-US" dirty="0"/>
+              <a:t>motor[3] = PIDMIX(-1,-1,-1); //Rear Left</a:t>
             </a:r>
           </a:p>
           <a:p>

</xml_diff>

<commit_message>
Add RTC to Drone log
</commit_message>
<xml_diff>
--- a/libraries/Diagramm Drone.pptx
+++ b/libraries/Diagramm Drone.pptx
@@ -12271,7 +12271,7 @@
             <p:ph idx="1"/>
             <p:extLst>
               <p:ext uri="{D42A27DB-BD31-4B8C-83A1-F6EECF244321}">
-                <p14:modId xmlns:p14="http://schemas.microsoft.com/office/powerpoint/2010/main" val="637914189"/>
+                <p14:modId xmlns:p14="http://schemas.microsoft.com/office/powerpoint/2010/main" val="592755495"/>
               </p:ext>
             </p:extLst>
           </p:nvPr>
@@ -12684,7 +12684,14 @@
                     <a:bodyPr/>
                     <a:lstStyle/>
                     <a:p>
-                      <a:endParaRPr lang="en-US" noProof="0"/>
+                      <a:r>
+                        <a:rPr lang="en-US" noProof="0"/>
+                        <a:t>MEGA2560 built in </a:t>
+                      </a:r>
+                      <a:r>
+                        <a:rPr lang="en-US" noProof="0" dirty="0"/>
+                        <a:t>Led</a:t>
+                      </a:r>
                     </a:p>
                   </a:txBody>
                   <a:tcPr/>
@@ -12694,7 +12701,10 @@
                     <a:bodyPr/>
                     <a:lstStyle/>
                     <a:p>
-                      <a:endParaRPr lang="en-US" noProof="0" dirty="0"/>
+                      <a:r>
+                        <a:rPr lang="en-US" noProof="0" dirty="0"/>
+                        <a:t>Monitor</a:t>
+                      </a:r>
                     </a:p>
                   </a:txBody>
                   <a:tcPr/>
@@ -12721,7 +12731,10 @@
                         <a:tabLst/>
                         <a:defRPr/>
                       </a:pPr>
-                      <a:endParaRPr lang="en-US" noProof="0" dirty="0"/>
+                      <a:r>
+                        <a:rPr lang="en-US" noProof="0" dirty="0"/>
+                        <a:t>Digital pin 13</a:t>
+                      </a:r>
                     </a:p>
                   </a:txBody>
                   <a:tcPr/>

</xml_diff>

<commit_message>
improve motor control and calib
</commit_message>
<xml_diff>
--- a/libraries/Diagramm Drone.pptx
+++ b/libraries/Diagramm Drone.pptx
@@ -3730,7 +3730,7 @@
           <a:p>
             <a:fld id="{0717AEF8-1597-4679-8926-916E82E12B07}" type="datetimeFigureOut">
               <a:rPr lang="fr-FR" smtClean="0"/>
-              <a:t>13/06/2019</a:t>
+              <a:t>05/07/2019</a:t>
             </a:fld>
             <a:endParaRPr lang="fr-FR"/>
           </a:p>
@@ -3928,7 +3928,7 @@
           <a:p>
             <a:fld id="{0717AEF8-1597-4679-8926-916E82E12B07}" type="datetimeFigureOut">
               <a:rPr lang="fr-FR" smtClean="0"/>
-              <a:t>13/06/2019</a:t>
+              <a:t>05/07/2019</a:t>
             </a:fld>
             <a:endParaRPr lang="fr-FR"/>
           </a:p>
@@ -4136,7 +4136,7 @@
           <a:p>
             <a:fld id="{0717AEF8-1597-4679-8926-916E82E12B07}" type="datetimeFigureOut">
               <a:rPr lang="fr-FR" smtClean="0"/>
-              <a:t>13/06/2019</a:t>
+              <a:t>05/07/2019</a:t>
             </a:fld>
             <a:endParaRPr lang="fr-FR"/>
           </a:p>
@@ -4334,7 +4334,7 @@
           <a:p>
             <a:fld id="{0717AEF8-1597-4679-8926-916E82E12B07}" type="datetimeFigureOut">
               <a:rPr lang="fr-FR" smtClean="0"/>
-              <a:t>13/06/2019</a:t>
+              <a:t>05/07/2019</a:t>
             </a:fld>
             <a:endParaRPr lang="fr-FR"/>
           </a:p>
@@ -4609,7 +4609,7 @@
           <a:p>
             <a:fld id="{0717AEF8-1597-4679-8926-916E82E12B07}" type="datetimeFigureOut">
               <a:rPr lang="fr-FR" smtClean="0"/>
-              <a:t>13/06/2019</a:t>
+              <a:t>05/07/2019</a:t>
             </a:fld>
             <a:endParaRPr lang="fr-FR"/>
           </a:p>
@@ -4874,7 +4874,7 @@
           <a:p>
             <a:fld id="{0717AEF8-1597-4679-8926-916E82E12B07}" type="datetimeFigureOut">
               <a:rPr lang="fr-FR" smtClean="0"/>
-              <a:t>13/06/2019</a:t>
+              <a:t>05/07/2019</a:t>
             </a:fld>
             <a:endParaRPr lang="fr-FR"/>
           </a:p>
@@ -5286,7 +5286,7 @@
           <a:p>
             <a:fld id="{0717AEF8-1597-4679-8926-916E82E12B07}" type="datetimeFigureOut">
               <a:rPr lang="fr-FR" smtClean="0"/>
-              <a:t>13/06/2019</a:t>
+              <a:t>05/07/2019</a:t>
             </a:fld>
             <a:endParaRPr lang="fr-FR"/>
           </a:p>
@@ -5427,7 +5427,7 @@
           <a:p>
             <a:fld id="{0717AEF8-1597-4679-8926-916E82E12B07}" type="datetimeFigureOut">
               <a:rPr lang="fr-FR" smtClean="0"/>
-              <a:t>13/06/2019</a:t>
+              <a:t>05/07/2019</a:t>
             </a:fld>
             <a:endParaRPr lang="fr-FR"/>
           </a:p>
@@ -5540,7 +5540,7 @@
           <a:p>
             <a:fld id="{0717AEF8-1597-4679-8926-916E82E12B07}" type="datetimeFigureOut">
               <a:rPr lang="fr-FR" smtClean="0"/>
-              <a:t>13/06/2019</a:t>
+              <a:t>05/07/2019</a:t>
             </a:fld>
             <a:endParaRPr lang="fr-FR"/>
           </a:p>
@@ -5851,7 +5851,7 @@
           <a:p>
             <a:fld id="{0717AEF8-1597-4679-8926-916E82E12B07}" type="datetimeFigureOut">
               <a:rPr lang="fr-FR" smtClean="0"/>
-              <a:t>13/06/2019</a:t>
+              <a:t>05/07/2019</a:t>
             </a:fld>
             <a:endParaRPr lang="fr-FR"/>
           </a:p>
@@ -6139,7 +6139,7 @@
           <a:p>
             <a:fld id="{0717AEF8-1597-4679-8926-916E82E12B07}" type="datetimeFigureOut">
               <a:rPr lang="fr-FR" smtClean="0"/>
-              <a:t>13/06/2019</a:t>
+              <a:t>05/07/2019</a:t>
             </a:fld>
             <a:endParaRPr lang="fr-FR"/>
           </a:p>
@@ -6380,7 +6380,7 @@
           <a:p>
             <a:fld id="{0717AEF8-1597-4679-8926-916E82E12B07}" type="datetimeFigureOut">
               <a:rPr lang="fr-FR" smtClean="0"/>
-              <a:t>13/06/2019</a:t>
+              <a:t>05/07/2019</a:t>
             </a:fld>
             <a:endParaRPr lang="fr-FR"/>
           </a:p>
@@ -14523,7 +14523,7 @@
             </a:r>
             <a:r>
               <a:rPr lang="fr-FR" dirty="0"/>
-              <a:t>: </a:t>
+              <a:t> (arbre): </a:t>
             </a:r>
             <a:r>
               <a:rPr lang="fr-FR" b="1" dirty="0"/>
@@ -14553,7 +14553,15 @@
             </a:br>
             <a:r>
               <a:rPr lang="fr-FR" dirty="0"/>
-              <a:t>Fil de Bolt: </a:t>
+              <a:t>Fil de Bolt </a:t>
+            </a:r>
+            <a:r>
+              <a:rPr lang="fr-FR"/>
+              <a:t>(boulon):</a:t>
+            </a:r>
+            <a:r>
+              <a:rPr lang="fr-FR" dirty="0"/>
+              <a:t> </a:t>
             </a:r>
             <a:r>
               <a:rPr lang="fr-FR" b="1" dirty="0"/>

</xml_diff>

<commit_message>
change range PWM of ESC
</commit_message>
<xml_diff>
--- a/libraries/Diagramm Drone.pptx
+++ b/libraries/Diagramm Drone.pptx
@@ -3731,7 +3731,7 @@
           <a:p>
             <a:fld id="{0717AEF8-1597-4679-8926-916E82E12B07}" type="datetimeFigureOut">
               <a:rPr lang="fr-FR" smtClean="0"/>
-              <a:t>24/09/2019</a:t>
+              <a:t>04/10/2019</a:t>
             </a:fld>
             <a:endParaRPr lang="fr-FR"/>
           </a:p>
@@ -3929,7 +3929,7 @@
           <a:p>
             <a:fld id="{0717AEF8-1597-4679-8926-916E82E12B07}" type="datetimeFigureOut">
               <a:rPr lang="fr-FR" smtClean="0"/>
-              <a:t>24/09/2019</a:t>
+              <a:t>04/10/2019</a:t>
             </a:fld>
             <a:endParaRPr lang="fr-FR"/>
           </a:p>
@@ -4137,7 +4137,7 @@
           <a:p>
             <a:fld id="{0717AEF8-1597-4679-8926-916E82E12B07}" type="datetimeFigureOut">
               <a:rPr lang="fr-FR" smtClean="0"/>
-              <a:t>24/09/2019</a:t>
+              <a:t>04/10/2019</a:t>
             </a:fld>
             <a:endParaRPr lang="fr-FR"/>
           </a:p>
@@ -4335,7 +4335,7 @@
           <a:p>
             <a:fld id="{0717AEF8-1597-4679-8926-916E82E12B07}" type="datetimeFigureOut">
               <a:rPr lang="fr-FR" smtClean="0"/>
-              <a:t>24/09/2019</a:t>
+              <a:t>04/10/2019</a:t>
             </a:fld>
             <a:endParaRPr lang="fr-FR"/>
           </a:p>
@@ -4610,7 +4610,7 @@
           <a:p>
             <a:fld id="{0717AEF8-1597-4679-8926-916E82E12B07}" type="datetimeFigureOut">
               <a:rPr lang="fr-FR" smtClean="0"/>
-              <a:t>24/09/2019</a:t>
+              <a:t>04/10/2019</a:t>
             </a:fld>
             <a:endParaRPr lang="fr-FR"/>
           </a:p>
@@ -4875,7 +4875,7 @@
           <a:p>
             <a:fld id="{0717AEF8-1597-4679-8926-916E82E12B07}" type="datetimeFigureOut">
               <a:rPr lang="fr-FR" smtClean="0"/>
-              <a:t>24/09/2019</a:t>
+              <a:t>04/10/2019</a:t>
             </a:fld>
             <a:endParaRPr lang="fr-FR"/>
           </a:p>
@@ -5287,7 +5287,7 @@
           <a:p>
             <a:fld id="{0717AEF8-1597-4679-8926-916E82E12B07}" type="datetimeFigureOut">
               <a:rPr lang="fr-FR" smtClean="0"/>
-              <a:t>24/09/2019</a:t>
+              <a:t>04/10/2019</a:t>
             </a:fld>
             <a:endParaRPr lang="fr-FR"/>
           </a:p>
@@ -5428,7 +5428,7 @@
           <a:p>
             <a:fld id="{0717AEF8-1597-4679-8926-916E82E12B07}" type="datetimeFigureOut">
               <a:rPr lang="fr-FR" smtClean="0"/>
-              <a:t>24/09/2019</a:t>
+              <a:t>04/10/2019</a:t>
             </a:fld>
             <a:endParaRPr lang="fr-FR"/>
           </a:p>
@@ -5541,7 +5541,7 @@
           <a:p>
             <a:fld id="{0717AEF8-1597-4679-8926-916E82E12B07}" type="datetimeFigureOut">
               <a:rPr lang="fr-FR" smtClean="0"/>
-              <a:t>24/09/2019</a:t>
+              <a:t>04/10/2019</a:t>
             </a:fld>
             <a:endParaRPr lang="fr-FR"/>
           </a:p>
@@ -5852,7 +5852,7 @@
           <a:p>
             <a:fld id="{0717AEF8-1597-4679-8926-916E82E12B07}" type="datetimeFigureOut">
               <a:rPr lang="fr-FR" smtClean="0"/>
-              <a:t>24/09/2019</a:t>
+              <a:t>04/10/2019</a:t>
             </a:fld>
             <a:endParaRPr lang="fr-FR"/>
           </a:p>
@@ -6140,7 +6140,7 @@
           <a:p>
             <a:fld id="{0717AEF8-1597-4679-8926-916E82E12B07}" type="datetimeFigureOut">
               <a:rPr lang="fr-FR" smtClean="0"/>
-              <a:t>24/09/2019</a:t>
+              <a:t>04/10/2019</a:t>
             </a:fld>
             <a:endParaRPr lang="fr-FR"/>
           </a:p>
@@ -6381,7 +6381,7 @@
           <a:p>
             <a:fld id="{0717AEF8-1597-4679-8926-916E82E12B07}" type="datetimeFigureOut">
               <a:rPr lang="fr-FR" smtClean="0"/>
-              <a:t>24/09/2019</a:t>
+              <a:t>04/10/2019</a:t>
             </a:fld>
             <a:endParaRPr lang="fr-FR"/>
           </a:p>
@@ -14961,7 +14961,7 @@
         <p:spPr/>
         <p:txBody>
           <a:bodyPr>
-            <a:normAutofit fontScale="77500" lnSpcReduction="20000"/>
+            <a:normAutofit fontScale="92500" lnSpcReduction="20000"/>
           </a:bodyPr>
           <a:lstStyle/>
           <a:p>
@@ -15028,12 +15028,44 @@
             </a:r>
             <a:r>
               <a:rPr lang="en-US" b="1" dirty="0"/>
-              <a:t> AE-20A Brushless ESC </a:t>
-            </a:r>
+              <a:t> </a:t>
+            </a:r>
+            <a:r>
+              <a:rPr lang="en-US" b="1" dirty="0" err="1"/>
+              <a:t>MultiStar</a:t>
+            </a:r>
+            <a:r>
+              <a:rPr lang="en-US" b="1" dirty="0"/>
+              <a:t> 20A </a:t>
+            </a:r>
+            <a:r>
+              <a:rPr lang="en-US" b="1" dirty="0" err="1"/>
+              <a:t>BLHeli</a:t>
+            </a:r>
+            <a:r>
+              <a:rPr lang="en-US" b="1" dirty="0"/>
+              <a:t>-S Rev16 V3 ESC 2~4S </a:t>
+            </a:r>
+            <a:r>
+              <a:rPr lang="en-US" b="1" dirty="0" err="1"/>
+              <a:t>Opto</a:t>
+            </a:r>
+            <a:endParaRPr lang="en-US" b="1" dirty="0"/>
+          </a:p>
+          <a:p>
+            <a:pPr marL="0" indent="0">
+              <a:buNone/>
+            </a:pPr>
             <a:r>
               <a:rPr lang="en-US" dirty="0"/>
-              <a:t>(Hobby king TAE-20A)</a:t>
-            </a:r>
+              <a:t>(Hobby king 9351000086-0)</a:t>
+            </a:r>
+          </a:p>
+          <a:p>
+            <a:pPr marL="0" indent="0">
+              <a:buNone/>
+            </a:pPr>
+            <a:endParaRPr lang="en-US" dirty="0"/>
           </a:p>
           <a:p>
             <a:pPr marL="457200" lvl="1" indent="0">
@@ -15041,181 +15073,56 @@
             </a:pPr>
             <a:r>
               <a:rPr lang="en-US" dirty="0"/>
-              <a:t>Sortie: 20A continue, </a:t>
-            </a:r>
-            <a:r>
-              <a:rPr lang="en-US" dirty="0" err="1"/>
-              <a:t>éclater</a:t>
-            </a:r>
-            <a:r>
-              <a:rPr lang="en-US" dirty="0"/>
-              <a:t> 25A </a:t>
-            </a:r>
-            <a:r>
-              <a:rPr lang="en-US" dirty="0" err="1"/>
-              <a:t>jusqu'à</a:t>
-            </a:r>
-            <a:r>
-              <a:rPr lang="en-US" dirty="0"/>
-              <a:t> 10 </a:t>
-            </a:r>
-            <a:r>
-              <a:rPr lang="en-US" dirty="0" err="1"/>
-              <a:t>secondes</a:t>
-            </a:r>
-            <a:r>
-              <a:rPr lang="en-US" dirty="0"/>
-              <a:t>. </a:t>
-            </a:r>
-            <a:br>
-              <a:rPr lang="en-US" dirty="0"/>
-            </a:br>
-            <a:r>
-              <a:rPr lang="en-US" dirty="0"/>
-              <a:t>Tension </a:t>
-            </a:r>
-            <a:r>
-              <a:rPr lang="en-US" dirty="0" err="1"/>
-              <a:t>d'entrée</a:t>
-            </a:r>
-            <a:r>
-              <a:rPr lang="en-US" dirty="0"/>
-              <a:t>: 2-4 cellules batterie lithium </a:t>
-            </a:r>
-            <a:r>
-              <a:rPr lang="en-US" dirty="0" err="1"/>
-              <a:t>ou</a:t>
-            </a:r>
-            <a:r>
-              <a:rPr lang="en-US" dirty="0"/>
-              <a:t> 5-12 cellules de batterie NIMH. </a:t>
-            </a:r>
-            <a:br>
-              <a:rPr lang="en-US" dirty="0"/>
-            </a:br>
-            <a:r>
-              <a:rPr lang="en-US" b="1" dirty="0"/>
-              <a:t>BEC: </a:t>
-            </a:r>
-            <a:r>
-              <a:rPr lang="en-US" b="1" dirty="0" err="1"/>
-              <a:t>Linéaire</a:t>
-            </a:r>
-            <a:r>
-              <a:rPr lang="en-US" b="1" dirty="0"/>
-              <a:t> 2A @ 5V</a:t>
-            </a:r>
-            <a:r>
-              <a:rPr lang="en-US" dirty="0"/>
-              <a:t> </a:t>
-            </a:r>
-            <a:br>
-              <a:rPr lang="en-US" dirty="0"/>
-            </a:br>
-            <a:r>
-              <a:rPr lang="en-US" dirty="0"/>
-              <a:t>Transmission Control Signal: </a:t>
-            </a:r>
-            <a:r>
-              <a:rPr lang="en-US" dirty="0" err="1"/>
-              <a:t>système</a:t>
-            </a:r>
-            <a:r>
-              <a:rPr lang="en-US" dirty="0"/>
-              <a:t> </a:t>
-            </a:r>
-            <a:r>
-              <a:rPr lang="en-US" dirty="0" err="1"/>
-              <a:t>opto</a:t>
-            </a:r>
-            <a:r>
-              <a:rPr lang="en-US" dirty="0"/>
-              <a:t> </a:t>
-            </a:r>
-            <a:r>
-              <a:rPr lang="en-US" dirty="0" err="1"/>
-              <a:t>couplé</a:t>
-            </a:r>
-            <a:r>
-              <a:rPr lang="en-US" dirty="0"/>
-              <a:t>. </a:t>
-            </a:r>
-            <a:br>
-              <a:rPr lang="en-US" dirty="0"/>
-            </a:br>
-            <a:r>
-              <a:rPr lang="en-US" dirty="0"/>
-              <a:t>Vitesse </a:t>
-            </a:r>
-            <a:r>
-              <a:rPr lang="en-US" dirty="0" err="1"/>
-              <a:t>maximale</a:t>
-            </a:r>
-            <a:r>
-              <a:rPr lang="en-US" dirty="0"/>
-              <a:t>: </a:t>
-            </a:r>
-            <a:br>
-              <a:rPr lang="en-US" dirty="0"/>
-            </a:br>
-            <a:r>
-              <a:rPr lang="en-US" dirty="0"/>
-              <a:t>	2 Pole: 	210,000rpm </a:t>
-            </a:r>
-            <a:br>
-              <a:rPr lang="en-US" dirty="0"/>
-            </a:br>
-            <a:r>
-              <a:rPr lang="en-US" dirty="0"/>
-              <a:t>	6 Pole: 	70,000rpm </a:t>
-            </a:r>
-            <a:br>
-              <a:rPr lang="en-US" dirty="0"/>
-            </a:br>
-            <a:r>
-              <a:rPr lang="en-US" dirty="0"/>
-              <a:t>	12 Pole: 	35,000rpm </a:t>
-            </a:r>
-            <a:br>
-              <a:rPr lang="en-US" dirty="0"/>
-            </a:br>
-            <a:r>
-              <a:rPr lang="en-US" dirty="0" err="1"/>
-              <a:t>Taille</a:t>
-            </a:r>
-            <a:r>
-              <a:rPr lang="en-US" dirty="0"/>
-              <a:t>: 	50mm (L) * 26mm (W) * 12mm (H). </a:t>
-            </a:r>
-            <a:br>
-              <a:rPr lang="en-US" dirty="0"/>
-            </a:br>
-            <a:r>
-              <a:rPr lang="en-US" b="1" dirty="0" err="1"/>
-              <a:t>Poids</a:t>
-            </a:r>
-            <a:r>
-              <a:rPr lang="en-US" b="1" dirty="0"/>
-              <a:t>: 	19g</a:t>
-            </a:r>
-            <a:r>
-              <a:rPr lang="en-US" dirty="0"/>
-              <a:t>.</a:t>
+              <a:t>Constant Current: 20A</a:t>
             </a:r>
           </a:p>
           <a:p>
             <a:pPr marL="457200" lvl="1" indent="0">
               <a:buNone/>
             </a:pPr>
-            <a:endParaRPr lang="en-US" dirty="0"/>
-          </a:p>
-          <a:p>
-            <a:pPr marL="0" indent="0">
+            <a:r>
+              <a:rPr lang="en-US" dirty="0"/>
+              <a:t>Peak Current: 25A</a:t>
+            </a:r>
+          </a:p>
+          <a:p>
+            <a:pPr marL="457200" lvl="1" indent="0">
               <a:buNone/>
             </a:pPr>
             <a:r>
               <a:rPr lang="en-US" dirty="0"/>
-              <a:t>The BEC power is 5v &lt; 7v min needed for Arduino MEGA2560, so I don’t use the BEC.</a:t>
+              <a:t>Input Voltage: 2~4S (7.4~14.8V)</a:t>
+            </a:r>
+          </a:p>
+          <a:p>
+            <a:pPr marL="457200" lvl="1" indent="0">
+              <a:buNone/>
+            </a:pPr>
+            <a:r>
+              <a:rPr lang="en-US" dirty="0"/>
+              <a:t>BEC: </a:t>
+            </a:r>
+            <a:r>
+              <a:rPr lang="en-US" b="1" dirty="0"/>
+              <a:t>None</a:t>
+            </a:r>
+          </a:p>
+          <a:p>
+            <a:pPr marL="457200" lvl="1" indent="0">
+              <a:buNone/>
+            </a:pPr>
+            <a:r>
+              <a:rPr lang="en-US" dirty="0"/>
+              <a:t>Dimensions: 27 x 12mm</a:t>
+            </a:r>
+          </a:p>
+          <a:p>
+            <a:pPr marL="457200" lvl="1" indent="0">
+              <a:buNone/>
+            </a:pPr>
+            <a:r>
+              <a:rPr lang="en-US" dirty="0"/>
+              <a:t>Weight: 7.9g</a:t>
             </a:r>
           </a:p>
         </p:txBody>
@@ -15285,897 +15192,41 @@
           </a:p>
         </p:txBody>
       </p:sp>
-      <p:graphicFrame>
-        <p:nvGraphicFramePr>
-          <p:cNvPr id="4" name="Espace réservé du contenu 3">
-            <a:extLst>
-              <a:ext uri="{FF2B5EF4-FFF2-40B4-BE49-F238E27FC236}">
-                <a16:creationId xmlns:a16="http://schemas.microsoft.com/office/drawing/2014/main" id="{003D9151-9798-4FFF-84EB-CA24DBFE390D}"/>
-              </a:ext>
-            </a:extLst>
-          </p:cNvPr>
-          <p:cNvGraphicFramePr>
-            <a:graphicFrameLocks noGrp="1"/>
-          </p:cNvGraphicFramePr>
+      <p:pic>
+        <p:nvPicPr>
+          <p:cNvPr id="7" name="Espace réservé du contenu 6" descr="Une image contenant capture d’écran&#10;&#10;Description générée automatiquement">
+            <a:extLst>
+              <a:ext uri="{FF2B5EF4-FFF2-40B4-BE49-F238E27FC236}">
+                <a16:creationId xmlns:a16="http://schemas.microsoft.com/office/drawing/2014/main" id="{D191BEC6-1CC5-4DA4-87DC-43EB6B7ED225}"/>
+              </a:ext>
+            </a:extLst>
+          </p:cNvPr>
+          <p:cNvPicPr>
+            <a:picLocks noGrp="1" noChangeAspect="1"/>
+          </p:cNvPicPr>
           <p:nvPr>
             <p:ph idx="1"/>
-            <p:extLst>
-              <p:ext uri="{D42A27DB-BD31-4B8C-83A1-F6EECF244321}">
-                <p14:modId xmlns:p14="http://schemas.microsoft.com/office/powerpoint/2010/main" val="219063334"/>
-              </p:ext>
-            </p:extLst>
           </p:nvPr>
-        </p:nvGraphicFramePr>
-        <p:xfrm>
-          <a:off x="870012" y="1109651"/>
-          <a:ext cx="10758570" cy="5615060"/>
-        </p:xfrm>
-        <a:graphic>
-          <a:graphicData uri="http://schemas.openxmlformats.org/drawingml/2006/table">
-            <a:tbl>
-              <a:tblPr firstRow="1" bandRow="1">
-                <a:tableStyleId>{5C22544A-7EE6-4342-B048-85BDC9FD1C3A}</a:tableStyleId>
-              </a:tblPr>
-              <a:tblGrid>
-                <a:gridCol w="2782779">
-                  <a:extLst>
-                    <a:ext uri="{9D8B030D-6E8A-4147-A177-3AD203B41FA5}">
-                      <a16:colId xmlns:a16="http://schemas.microsoft.com/office/drawing/2014/main" val="2232030455"/>
-                    </a:ext>
-                  </a:extLst>
-                </a:gridCol>
-                <a:gridCol w="5953027">
-                  <a:extLst>
-                    <a:ext uri="{9D8B030D-6E8A-4147-A177-3AD203B41FA5}">
-                      <a16:colId xmlns:a16="http://schemas.microsoft.com/office/drawing/2014/main" val="3945422049"/>
-                    </a:ext>
-                  </a:extLst>
-                </a:gridCol>
-                <a:gridCol w="1145309">
-                  <a:extLst>
-                    <a:ext uri="{9D8B030D-6E8A-4147-A177-3AD203B41FA5}">
-                      <a16:colId xmlns:a16="http://schemas.microsoft.com/office/drawing/2014/main" val="3592764086"/>
-                    </a:ext>
-                  </a:extLst>
-                </a:gridCol>
-                <a:gridCol w="877455">
-                  <a:extLst>
-                    <a:ext uri="{9D8B030D-6E8A-4147-A177-3AD203B41FA5}">
-                      <a16:colId xmlns:a16="http://schemas.microsoft.com/office/drawing/2014/main" val="303937432"/>
-                    </a:ext>
-                  </a:extLst>
-                </a:gridCol>
-              </a:tblGrid>
-              <a:tr h="342118">
-                <a:tc>
-                  <a:txBody>
-                    <a:bodyPr/>
-                    <a:lstStyle/>
-                    <a:p>
-                      <a:r>
-                        <a:rPr lang="fr-FR" dirty="0"/>
-                        <a:t>Configuration</a:t>
-                      </a:r>
-                    </a:p>
-                  </a:txBody>
-                  <a:tcPr/>
-                </a:tc>
-                <a:tc>
-                  <a:txBody>
-                    <a:bodyPr/>
-                    <a:lstStyle/>
-                    <a:p>
-                      <a:r>
-                        <a:rPr lang="fr-FR" dirty="0"/>
-                        <a:t>Value</a:t>
-                      </a:r>
-                    </a:p>
-                  </a:txBody>
-                  <a:tcPr/>
-                </a:tc>
-                <a:tc>
-                  <a:txBody>
-                    <a:bodyPr/>
-                    <a:lstStyle/>
-                    <a:p>
-                      <a:r>
-                        <a:rPr lang="fr-FR" dirty="0" err="1"/>
-                        <a:t>Throttle</a:t>
-                      </a:r>
-                      <a:r>
-                        <a:rPr lang="fr-FR" dirty="0"/>
-                        <a:t> stick</a:t>
-                      </a:r>
-                    </a:p>
-                  </a:txBody>
-                  <a:tcPr/>
-                </a:tc>
-                <a:tc>
-                  <a:txBody>
-                    <a:bodyPr/>
-                    <a:lstStyle/>
-                    <a:p>
-                      <a:r>
-                        <a:rPr lang="fr-FR" dirty="0"/>
-                        <a:t>Nb </a:t>
-                      </a:r>
-                      <a:r>
-                        <a:rPr lang="fr-FR" dirty="0" err="1"/>
-                        <a:t>beeps</a:t>
-                      </a:r>
-                      <a:endParaRPr lang="fr-FR" dirty="0"/>
-                    </a:p>
-                  </a:txBody>
-                  <a:tcPr/>
-                </a:tc>
-                <a:extLst>
-                  <a:ext uri="{0D108BD9-81ED-4DB2-BD59-A6C34878D82A}">
-                    <a16:rowId xmlns:a16="http://schemas.microsoft.com/office/drawing/2014/main" val="3930063906"/>
-                  </a:ext>
-                </a:extLst>
-              </a:tr>
-              <a:tr h="672245">
-                <a:tc>
-                  <a:txBody>
-                    <a:bodyPr/>
-                    <a:lstStyle/>
-                    <a:p>
-                      <a:r>
-                        <a:rPr lang="en-US" dirty="0"/>
-                        <a:t>Brake</a:t>
-                      </a:r>
-                    </a:p>
-                  </a:txBody>
-                  <a:tcPr/>
-                </a:tc>
-                <a:tc>
-                  <a:txBody>
-                    <a:bodyPr/>
-                    <a:lstStyle/>
-                    <a:p>
-                      <a:r>
-                        <a:rPr lang="en-US" dirty="0"/>
-                        <a:t>Off</a:t>
-                      </a:r>
-                    </a:p>
-                  </a:txBody>
-                  <a:tcPr/>
-                </a:tc>
-                <a:tc>
-                  <a:txBody>
-                    <a:bodyPr/>
-                    <a:lstStyle/>
-                    <a:p>
-                      <a:pPr marL="0" marR="0" lvl="0" indent="0" algn="l" defTabSz="914400" rtl="0" eaLnBrk="1" fontAlgn="auto" latinLnBrk="0" hangingPunct="1">
-                        <a:lnSpc>
-                          <a:spcPct val="100000"/>
-                        </a:lnSpc>
-                        <a:spcBef>
-                          <a:spcPts val="0"/>
-                        </a:spcBef>
-                        <a:spcAft>
-                          <a:spcPts val="0"/>
-                        </a:spcAft>
-                        <a:buClrTx/>
-                        <a:buSzTx/>
-                        <a:buFont typeface="Wingdings" panose="05000000000000000000" pitchFamily="2" charset="2"/>
-                        <a:buNone/>
-                        <a:tabLst/>
-                        <a:defRPr/>
-                      </a:pPr>
-                      <a:r>
-                        <a:rPr kumimoji="0" lang="en-US" sz="1800" b="0" i="0" u="none" strike="noStrike" kern="1200" cap="none" spc="0" normalizeH="0" baseline="0" noProof="0" dirty="0">
-                          <a:ln>
-                            <a:noFill/>
-                          </a:ln>
-                          <a:solidFill>
-                            <a:schemeClr val="tx1"/>
-                          </a:solidFill>
-                          <a:effectLst/>
-                          <a:uLnTx/>
-                          <a:uFillTx/>
-                          <a:latin typeface="+mn-lt"/>
-                          <a:ea typeface="+mn-ea"/>
-                          <a:cs typeface="+mn-cs"/>
-                        </a:rPr>
-                        <a:t>Low</a:t>
-                      </a:r>
-                      <a:endParaRPr kumimoji="0" lang="en-US" sz="1800" b="0" i="0" u="none" strike="noStrike" kern="1200" cap="none" spc="0" normalizeH="0" baseline="0" noProof="0" dirty="0">
-                        <a:ln>
-                          <a:noFill/>
-                        </a:ln>
-                        <a:solidFill>
-                          <a:schemeClr val="tx1"/>
-                        </a:solidFill>
-                        <a:effectLst/>
-                        <a:uLnTx/>
-                        <a:uFillTx/>
-                        <a:latin typeface="Calibri" panose="020F0502020204030204"/>
-                        <a:ea typeface="+mn-ea"/>
-                        <a:cs typeface="+mn-cs"/>
-                      </a:endParaRPr>
-                    </a:p>
-                  </a:txBody>
-                  <a:tcPr/>
-                </a:tc>
-                <a:tc>
-                  <a:txBody>
-                    <a:bodyPr/>
-                    <a:lstStyle/>
-                    <a:p>
-                      <a:pPr marL="0" marR="0" lvl="0" indent="0" algn="l" defTabSz="914400" rtl="0" eaLnBrk="1" fontAlgn="auto" latinLnBrk="0" hangingPunct="1">
-                        <a:lnSpc>
-                          <a:spcPct val="100000"/>
-                        </a:lnSpc>
-                        <a:spcBef>
-                          <a:spcPts val="0"/>
-                        </a:spcBef>
-                        <a:spcAft>
-                          <a:spcPts val="0"/>
-                        </a:spcAft>
-                        <a:buClrTx/>
-                        <a:buSzTx/>
-                        <a:buFont typeface="Wingdings" panose="05000000000000000000" pitchFamily="2" charset="2"/>
-                        <a:buNone/>
-                        <a:tabLst/>
-                        <a:defRPr/>
-                      </a:pPr>
-                      <a:r>
-                        <a:rPr kumimoji="0" lang="en-US" sz="1800" b="0" i="0" u="none" strike="noStrike" kern="1200" cap="none" spc="0" normalizeH="0" baseline="0" noProof="0" dirty="0">
-                          <a:ln>
-                            <a:noFill/>
-                          </a:ln>
-                          <a:solidFill>
-                            <a:srgbClr val="FF0000"/>
-                          </a:solidFill>
-                          <a:effectLst/>
-                          <a:uLnTx/>
-                          <a:uFillTx/>
-                          <a:latin typeface="Calibri" panose="020F0502020204030204"/>
-                          <a:ea typeface="+mn-ea"/>
-                          <a:cs typeface="+mn-cs"/>
-                        </a:rPr>
-                        <a:t>1</a:t>
-                      </a:r>
-                    </a:p>
-                  </a:txBody>
-                  <a:tcPr/>
-                </a:tc>
-                <a:extLst>
-                  <a:ext uri="{0D108BD9-81ED-4DB2-BD59-A6C34878D82A}">
-                    <a16:rowId xmlns:a16="http://schemas.microsoft.com/office/drawing/2014/main" val="3459295351"/>
-                  </a:ext>
-                </a:extLst>
-              </a:tr>
-              <a:tr h="672245">
-                <a:tc>
-                  <a:txBody>
-                    <a:bodyPr/>
-                    <a:lstStyle/>
-                    <a:p>
-                      <a:r>
-                        <a:rPr lang="en-US" dirty="0"/>
-                        <a:t>Timing</a:t>
-                      </a:r>
-                    </a:p>
-                  </a:txBody>
-                  <a:tcPr/>
-                </a:tc>
-                <a:tc>
-                  <a:txBody>
-                    <a:bodyPr/>
-                    <a:lstStyle/>
-                    <a:p>
-                      <a:r>
-                        <a:rPr lang="en-US" dirty="0"/>
-                        <a:t>Medium (for motors with more than 6 poles)</a:t>
-                      </a:r>
-                    </a:p>
-                  </a:txBody>
-                  <a:tcPr/>
-                </a:tc>
-                <a:tc>
-                  <a:txBody>
-                    <a:bodyPr/>
-                    <a:lstStyle/>
-                    <a:p>
-                      <a:pPr marL="0" marR="0" lvl="0" indent="0" algn="l" defTabSz="914400" rtl="0" eaLnBrk="1" fontAlgn="auto" latinLnBrk="0" hangingPunct="1">
-                        <a:lnSpc>
-                          <a:spcPct val="100000"/>
-                        </a:lnSpc>
-                        <a:spcBef>
-                          <a:spcPts val="0"/>
-                        </a:spcBef>
-                        <a:spcAft>
-                          <a:spcPts val="0"/>
-                        </a:spcAft>
-                        <a:buClrTx/>
-                        <a:buSzTx/>
-                        <a:buFont typeface="Wingdings" panose="05000000000000000000" pitchFamily="2" charset="2"/>
-                        <a:buNone/>
-                        <a:tabLst/>
-                        <a:defRPr/>
-                      </a:pPr>
-                      <a:r>
-                        <a:rPr kumimoji="0" lang="en-US" sz="1800" b="0" i="0" u="none" strike="noStrike" kern="1200" cap="none" spc="0" normalizeH="0" baseline="0" noProof="0" dirty="0">
-                          <a:ln>
-                            <a:noFill/>
-                          </a:ln>
-                          <a:solidFill>
-                            <a:schemeClr val="tx1"/>
-                          </a:solidFill>
-                          <a:effectLst/>
-                          <a:uLnTx/>
-                          <a:uFillTx/>
-                          <a:latin typeface="+mn-lt"/>
-                          <a:ea typeface="+mn-ea"/>
-                          <a:cs typeface="+mn-cs"/>
-                        </a:rPr>
-                        <a:t>Medium</a:t>
-                      </a:r>
-                    </a:p>
-                  </a:txBody>
-                  <a:tcPr/>
-                </a:tc>
-                <a:tc>
-                  <a:txBody>
-                    <a:bodyPr/>
-                    <a:lstStyle/>
-                    <a:p>
-                      <a:pPr marL="0" marR="0" lvl="0" indent="0" algn="l" defTabSz="914400" rtl="0" eaLnBrk="1" fontAlgn="auto" latinLnBrk="0" hangingPunct="1">
-                        <a:lnSpc>
-                          <a:spcPct val="100000"/>
-                        </a:lnSpc>
-                        <a:spcBef>
-                          <a:spcPts val="0"/>
-                        </a:spcBef>
-                        <a:spcAft>
-                          <a:spcPts val="0"/>
-                        </a:spcAft>
-                        <a:buClrTx/>
-                        <a:buSzTx/>
-                        <a:buFont typeface="Wingdings" panose="05000000000000000000" pitchFamily="2" charset="2"/>
-                        <a:buNone/>
-                        <a:tabLst/>
-                        <a:defRPr/>
-                      </a:pPr>
-                      <a:r>
-                        <a:rPr kumimoji="0" lang="en-US" sz="1800" b="0" i="0" u="none" strike="noStrike" kern="1200" cap="none" spc="0" normalizeH="0" baseline="0" noProof="0" dirty="0">
-                          <a:ln>
-                            <a:noFill/>
-                          </a:ln>
-                          <a:solidFill>
-                            <a:srgbClr val="FF0000"/>
-                          </a:solidFill>
-                          <a:effectLst/>
-                          <a:uLnTx/>
-                          <a:uFillTx/>
-                          <a:latin typeface="+mn-lt"/>
-                          <a:ea typeface="+mn-ea"/>
-                          <a:cs typeface="+mn-cs"/>
-                        </a:rPr>
-                        <a:t>2</a:t>
-                      </a:r>
-                    </a:p>
-                  </a:txBody>
-                  <a:tcPr/>
-                </a:tc>
-                <a:extLst>
-                  <a:ext uri="{0D108BD9-81ED-4DB2-BD59-A6C34878D82A}">
-                    <a16:rowId xmlns:a16="http://schemas.microsoft.com/office/drawing/2014/main" val="11531206"/>
-                  </a:ext>
-                </a:extLst>
-              </a:tr>
-              <a:tr h="672245">
-                <a:tc>
-                  <a:txBody>
-                    <a:bodyPr/>
-                    <a:lstStyle/>
-                    <a:p>
-                      <a:pPr marL="0" algn="l" defTabSz="914400" rtl="0" eaLnBrk="1" latinLnBrk="0" hangingPunct="1"/>
-                      <a:r>
-                        <a:rPr lang="en-US" sz="1800" kern="1200" dirty="0">
-                          <a:solidFill>
-                            <a:schemeClr val="dk1"/>
-                          </a:solidFill>
-                          <a:latin typeface="+mn-lt"/>
-                          <a:ea typeface="+mn-ea"/>
-                          <a:cs typeface="+mn-cs"/>
-                        </a:rPr>
-                        <a:t>Battery protection voltage threshold</a:t>
-                      </a:r>
-                    </a:p>
-                  </a:txBody>
-                  <a:tcPr/>
-                </a:tc>
-                <a:tc>
-                  <a:txBody>
-                    <a:bodyPr/>
-                    <a:lstStyle/>
-                    <a:p>
-                      <a:r>
-                        <a:rPr lang="en-US" dirty="0"/>
-                        <a:t>Medium cut-off threshold: </a:t>
-                      </a:r>
-                    </a:p>
-                    <a:p>
-                      <a:pPr marL="742950" lvl="1" indent="-285750">
-                        <a:buFont typeface="Arial" panose="020B0604020202020204" pitchFamily="34" charset="0"/>
-                        <a:buChar char="•"/>
-                      </a:pPr>
-                      <a:r>
-                        <a:rPr lang="en-US" dirty="0"/>
-                        <a:t>First stage 3V/cell</a:t>
-                      </a:r>
-                    </a:p>
-                    <a:p>
-                      <a:pPr marL="742950" lvl="1" indent="-285750">
-                        <a:buFont typeface="Arial" panose="020B0604020202020204" pitchFamily="34" charset="0"/>
-                        <a:buChar char="•"/>
-                      </a:pPr>
-                      <a:r>
-                        <a:rPr lang="en-US" dirty="0"/>
-                        <a:t>Second stage 2.8V/cell</a:t>
-                      </a:r>
-                    </a:p>
-                    <a:p>
-                      <a:r>
-                        <a:rPr lang="en-US" sz="1800" b="0" i="0" u="none" strike="noStrike" kern="1200" dirty="0">
-                          <a:solidFill>
-                            <a:schemeClr val="dk1"/>
-                          </a:solidFill>
-                          <a:effectLst/>
-                          <a:latin typeface="+mn-lt"/>
-                          <a:ea typeface="+mn-ea"/>
-                          <a:cs typeface="+mn-cs"/>
-                        </a:rPr>
-                        <a:t>Do not lower below 2.8v - 3.0V per element.</a:t>
-                      </a:r>
-                      <a:r>
-                        <a:rPr lang="en-US" sz="1800" b="0" i="0" kern="1200" dirty="0">
-                          <a:solidFill>
-                            <a:schemeClr val="dk1"/>
-                          </a:solidFill>
-                          <a:effectLst/>
-                          <a:latin typeface="+mn-lt"/>
-                          <a:ea typeface="+mn-ea"/>
-                          <a:cs typeface="+mn-cs"/>
-                        </a:rPr>
-                        <a:t> </a:t>
-                      </a:r>
-                    </a:p>
-                    <a:p>
-                      <a:r>
-                        <a:rPr lang="en-US" sz="1800" b="0" i="0" u="none" strike="noStrike" kern="1200" dirty="0">
-                          <a:solidFill>
-                            <a:schemeClr val="dk1"/>
-                          </a:solidFill>
-                          <a:effectLst/>
-                          <a:latin typeface="+mn-lt"/>
-                          <a:ea typeface="+mn-ea"/>
-                          <a:cs typeface="+mn-cs"/>
-                        </a:rPr>
-                        <a:t>Destruction voltage is 2.5V (if this threshold is reached, it is trash!) </a:t>
-                      </a:r>
-                    </a:p>
-                    <a:p>
-                      <a:r>
-                        <a:rPr lang="en-US" sz="1800" b="0" i="0" u="none" strike="noStrike" kern="1200" dirty="0">
-                          <a:solidFill>
-                            <a:schemeClr val="dk1"/>
-                          </a:solidFill>
-                          <a:effectLst/>
-                          <a:latin typeface="+mn-lt"/>
-                          <a:ea typeface="+mn-ea"/>
-                          <a:cs typeface="+mn-cs"/>
-                        </a:rPr>
-                        <a:t>LiPo accumulators have a nominal voltage of 3.7V per element</a:t>
-                      </a:r>
-                      <a:endParaRPr lang="en-US" dirty="0"/>
-                    </a:p>
-                  </a:txBody>
-                  <a:tcPr/>
-                </a:tc>
-                <a:tc>
-                  <a:txBody>
-                    <a:bodyPr/>
-                    <a:lstStyle/>
-                    <a:p>
-                      <a:pPr marL="0" marR="0" lvl="0" indent="0" algn="l" defTabSz="914400" rtl="0" eaLnBrk="1" fontAlgn="auto" latinLnBrk="0" hangingPunct="1">
-                        <a:lnSpc>
-                          <a:spcPct val="100000"/>
-                        </a:lnSpc>
-                        <a:spcBef>
-                          <a:spcPts val="0"/>
-                        </a:spcBef>
-                        <a:spcAft>
-                          <a:spcPts val="0"/>
-                        </a:spcAft>
-                        <a:buClrTx/>
-                        <a:buSzTx/>
-                        <a:buFont typeface="Wingdings" panose="05000000000000000000" pitchFamily="2" charset="2"/>
-                        <a:buNone/>
-                        <a:tabLst/>
-                        <a:defRPr/>
-                      </a:pPr>
-                      <a:r>
-                        <a:rPr kumimoji="0" lang="en-US" sz="1800" b="0" i="0" u="none" strike="noStrike" kern="1200" cap="none" spc="0" normalizeH="0" baseline="0" noProof="0" dirty="0">
-                          <a:ln>
-                            <a:noFill/>
-                          </a:ln>
-                          <a:solidFill>
-                            <a:schemeClr val="tx1"/>
-                          </a:solidFill>
-                          <a:effectLst/>
-                          <a:uLnTx/>
-                          <a:uFillTx/>
-                          <a:latin typeface="+mn-lt"/>
-                          <a:ea typeface="+mn-ea"/>
-                          <a:cs typeface="+mn-cs"/>
-                        </a:rPr>
-                        <a:t>Medium</a:t>
-                      </a:r>
-                    </a:p>
-                    <a:p>
-                      <a:pPr marL="285750" marR="0" lvl="0" indent="-285750" algn="l" defTabSz="914400" rtl="0" eaLnBrk="1" fontAlgn="auto" latinLnBrk="0" hangingPunct="1">
-                        <a:lnSpc>
-                          <a:spcPct val="100000"/>
-                        </a:lnSpc>
-                        <a:spcBef>
-                          <a:spcPts val="0"/>
-                        </a:spcBef>
-                        <a:spcAft>
-                          <a:spcPts val="0"/>
-                        </a:spcAft>
-                        <a:buClrTx/>
-                        <a:buSzTx/>
-                        <a:buFont typeface="Wingdings" panose="05000000000000000000" pitchFamily="2" charset="2"/>
-                        <a:buChar char="ü"/>
-                        <a:tabLst/>
-                        <a:defRPr/>
-                      </a:pPr>
-                      <a:endParaRPr kumimoji="0" lang="en-US" sz="1800" b="0" i="0" u="none" strike="noStrike" kern="1200" cap="none" spc="0" normalizeH="0" baseline="0" noProof="0" dirty="0">
-                        <a:ln>
-                          <a:noFill/>
-                        </a:ln>
-                        <a:solidFill>
-                          <a:schemeClr val="tx1"/>
-                        </a:solidFill>
-                        <a:effectLst/>
-                        <a:uLnTx/>
-                        <a:uFillTx/>
-                        <a:latin typeface="+mn-lt"/>
-                        <a:ea typeface="+mn-ea"/>
-                        <a:cs typeface="+mn-cs"/>
-                      </a:endParaRPr>
-                    </a:p>
-                  </a:txBody>
-                  <a:tcPr/>
-                </a:tc>
-                <a:tc>
-                  <a:txBody>
-                    <a:bodyPr/>
-                    <a:lstStyle/>
-                    <a:p>
-                      <a:pPr marL="0" marR="0" lvl="0" indent="0" algn="l" defTabSz="914400" rtl="0" eaLnBrk="1" fontAlgn="auto" latinLnBrk="0" hangingPunct="1">
-                        <a:lnSpc>
-                          <a:spcPct val="100000"/>
-                        </a:lnSpc>
-                        <a:spcBef>
-                          <a:spcPts val="0"/>
-                        </a:spcBef>
-                        <a:spcAft>
-                          <a:spcPts val="0"/>
-                        </a:spcAft>
-                        <a:buClrTx/>
-                        <a:buSzTx/>
-                        <a:buFont typeface="Wingdings" panose="05000000000000000000" pitchFamily="2" charset="2"/>
-                        <a:buNone/>
-                        <a:tabLst/>
-                        <a:defRPr/>
-                      </a:pPr>
-                      <a:r>
-                        <a:rPr kumimoji="0" lang="en-US" sz="1800" b="0" i="0" u="none" strike="noStrike" kern="1200" cap="none" spc="0" normalizeH="0" baseline="0" noProof="0" dirty="0">
-                          <a:ln>
-                            <a:noFill/>
-                          </a:ln>
-                          <a:solidFill>
-                            <a:srgbClr val="FF0000"/>
-                          </a:solidFill>
-                          <a:effectLst/>
-                          <a:uLnTx/>
-                          <a:uFillTx/>
-                          <a:latin typeface="+mn-lt"/>
-                          <a:ea typeface="+mn-ea"/>
-                          <a:cs typeface="+mn-cs"/>
-                        </a:rPr>
-                        <a:t>2</a:t>
-                      </a:r>
-                    </a:p>
-                  </a:txBody>
-                  <a:tcPr/>
-                </a:tc>
-                <a:extLst>
-                  <a:ext uri="{0D108BD9-81ED-4DB2-BD59-A6C34878D82A}">
-                    <a16:rowId xmlns:a16="http://schemas.microsoft.com/office/drawing/2014/main" val="1140387248"/>
-                  </a:ext>
-                </a:extLst>
-              </a:tr>
-              <a:tr h="672245">
-                <a:tc>
-                  <a:txBody>
-                    <a:bodyPr/>
-                    <a:lstStyle/>
-                    <a:p>
-                      <a:r>
-                        <a:rPr lang="en-US" dirty="0"/>
-                        <a:t>Plane mode</a:t>
-                      </a:r>
-                    </a:p>
-                  </a:txBody>
-                  <a:tcPr/>
-                </a:tc>
-                <a:tc>
-                  <a:txBody>
-                    <a:bodyPr/>
-                    <a:lstStyle/>
-                    <a:p>
-                      <a:r>
-                        <a:rPr lang="en-US" dirty="0"/>
-                        <a:t>Fixed-wing aircrafts</a:t>
-                      </a:r>
-                    </a:p>
-                  </a:txBody>
-                  <a:tcPr/>
-                </a:tc>
-                <a:tc>
-                  <a:txBody>
-                    <a:bodyPr/>
-                    <a:lstStyle/>
-                    <a:p>
-                      <a:pPr marL="0" marR="0" lvl="0" indent="0" algn="l" defTabSz="914400" rtl="0" eaLnBrk="1" fontAlgn="auto" latinLnBrk="0" hangingPunct="1">
-                        <a:lnSpc>
-                          <a:spcPct val="100000"/>
-                        </a:lnSpc>
-                        <a:spcBef>
-                          <a:spcPts val="0"/>
-                        </a:spcBef>
-                        <a:spcAft>
-                          <a:spcPts val="0"/>
-                        </a:spcAft>
-                        <a:buClrTx/>
-                        <a:buSzTx/>
-                        <a:buFont typeface="Wingdings" panose="05000000000000000000" pitchFamily="2" charset="2"/>
-                        <a:buNone/>
-                        <a:tabLst/>
-                        <a:defRPr/>
-                      </a:pPr>
-                      <a:r>
-                        <a:rPr kumimoji="0" lang="en-US" sz="1800" b="0" i="0" u="none" strike="noStrike" kern="1200" cap="none" spc="0" normalizeH="0" baseline="0" noProof="0" dirty="0">
-                          <a:ln>
-                            <a:noFill/>
-                          </a:ln>
-                          <a:solidFill>
-                            <a:schemeClr val="tx1"/>
-                          </a:solidFill>
-                          <a:effectLst/>
-                          <a:uLnTx/>
-                          <a:uFillTx/>
-                          <a:latin typeface="+mn-lt"/>
-                          <a:ea typeface="+mn-ea"/>
-                          <a:cs typeface="+mn-cs"/>
-                        </a:rPr>
-                        <a:t>Low</a:t>
-                      </a:r>
-                    </a:p>
-                    <a:p>
-                      <a:pPr marL="285750" marR="0" lvl="0" indent="-285750" algn="l" defTabSz="914400" rtl="0" eaLnBrk="1" fontAlgn="auto" latinLnBrk="0" hangingPunct="1">
-                        <a:lnSpc>
-                          <a:spcPct val="100000"/>
-                        </a:lnSpc>
-                        <a:spcBef>
-                          <a:spcPts val="0"/>
-                        </a:spcBef>
-                        <a:spcAft>
-                          <a:spcPts val="0"/>
-                        </a:spcAft>
-                        <a:buClrTx/>
-                        <a:buSzTx/>
-                        <a:buFont typeface="Wingdings" panose="05000000000000000000" pitchFamily="2" charset="2"/>
-                        <a:buChar char="ü"/>
-                        <a:tabLst/>
-                        <a:defRPr/>
-                      </a:pPr>
-                      <a:endParaRPr kumimoji="0" lang="en-US" sz="1800" b="0" i="0" u="none" strike="noStrike" kern="1200" cap="none" spc="0" normalizeH="0" baseline="0" noProof="0" dirty="0">
-                        <a:ln>
-                          <a:noFill/>
-                        </a:ln>
-                        <a:solidFill>
-                          <a:schemeClr val="tx1"/>
-                        </a:solidFill>
-                        <a:effectLst/>
-                        <a:uLnTx/>
-                        <a:uFillTx/>
-                        <a:latin typeface="+mn-lt"/>
-                        <a:ea typeface="+mn-ea"/>
-                        <a:cs typeface="+mn-cs"/>
-                      </a:endParaRPr>
-                    </a:p>
-                  </a:txBody>
-                  <a:tcPr/>
-                </a:tc>
-                <a:tc>
-                  <a:txBody>
-                    <a:bodyPr/>
-                    <a:lstStyle/>
-                    <a:p>
-                      <a:pPr marL="0" marR="0" lvl="0" indent="0" algn="l" defTabSz="914400" rtl="0" eaLnBrk="1" fontAlgn="auto" latinLnBrk="0" hangingPunct="1">
-                        <a:lnSpc>
-                          <a:spcPct val="100000"/>
-                        </a:lnSpc>
-                        <a:spcBef>
-                          <a:spcPts val="0"/>
-                        </a:spcBef>
-                        <a:spcAft>
-                          <a:spcPts val="0"/>
-                        </a:spcAft>
-                        <a:buClrTx/>
-                        <a:buSzTx/>
-                        <a:buFont typeface="Wingdings" panose="05000000000000000000" pitchFamily="2" charset="2"/>
-                        <a:buNone/>
-                        <a:tabLst/>
-                        <a:defRPr/>
-                      </a:pPr>
-                      <a:r>
-                        <a:rPr kumimoji="0" lang="en-US" sz="1800" b="0" i="0" u="none" strike="noStrike" kern="1200" cap="none" spc="0" normalizeH="0" baseline="0" noProof="0" dirty="0">
-                          <a:ln>
-                            <a:noFill/>
-                          </a:ln>
-                          <a:solidFill>
-                            <a:srgbClr val="FF0000"/>
-                          </a:solidFill>
-                          <a:effectLst/>
-                          <a:uLnTx/>
-                          <a:uFillTx/>
-                          <a:latin typeface="+mn-lt"/>
-                          <a:ea typeface="+mn-ea"/>
-                          <a:cs typeface="+mn-cs"/>
-                        </a:rPr>
-                        <a:t>1</a:t>
-                      </a:r>
-                    </a:p>
-                  </a:txBody>
-                  <a:tcPr/>
-                </a:tc>
-                <a:extLst>
-                  <a:ext uri="{0D108BD9-81ED-4DB2-BD59-A6C34878D82A}">
-                    <a16:rowId xmlns:a16="http://schemas.microsoft.com/office/drawing/2014/main" val="4031062607"/>
-                  </a:ext>
-                </a:extLst>
-              </a:tr>
-              <a:tr h="672245">
-                <a:tc>
-                  <a:txBody>
-                    <a:bodyPr/>
-                    <a:lstStyle/>
-                    <a:p>
-                      <a:r>
-                        <a:rPr lang="en-US" dirty="0"/>
-                        <a:t>Throttle response speed</a:t>
-                      </a:r>
-                    </a:p>
-                  </a:txBody>
-                  <a:tcPr/>
-                </a:tc>
-                <a:tc>
-                  <a:txBody>
-                    <a:bodyPr/>
-                    <a:lstStyle/>
-                    <a:p>
-                      <a:r>
-                        <a:rPr lang="en-US" dirty="0"/>
-                        <a:t>Normal</a:t>
-                      </a:r>
-                    </a:p>
-                  </a:txBody>
-                  <a:tcPr/>
-                </a:tc>
-                <a:tc>
-                  <a:txBody>
-                    <a:bodyPr/>
-                    <a:lstStyle/>
-                    <a:p>
-                      <a:pPr marL="0" marR="0" lvl="0" indent="0" algn="l" defTabSz="914400" rtl="0" eaLnBrk="1" fontAlgn="auto" latinLnBrk="0" hangingPunct="1">
-                        <a:lnSpc>
-                          <a:spcPct val="100000"/>
-                        </a:lnSpc>
-                        <a:spcBef>
-                          <a:spcPts val="0"/>
-                        </a:spcBef>
-                        <a:spcAft>
-                          <a:spcPts val="0"/>
-                        </a:spcAft>
-                        <a:buClrTx/>
-                        <a:buSzTx/>
-                        <a:buFont typeface="Wingdings" panose="05000000000000000000" pitchFamily="2" charset="2"/>
-                        <a:buNone/>
-                        <a:tabLst/>
-                        <a:defRPr/>
-                      </a:pPr>
-                      <a:r>
-                        <a:rPr kumimoji="0" lang="en-US" sz="1800" b="0" i="0" u="none" strike="noStrike" kern="1200" cap="none" spc="0" normalizeH="0" baseline="0" noProof="0" dirty="0">
-                          <a:ln>
-                            <a:noFill/>
-                          </a:ln>
-                          <a:solidFill>
-                            <a:schemeClr val="tx1"/>
-                          </a:solidFill>
-                          <a:effectLst/>
-                          <a:uLnTx/>
-                          <a:uFillTx/>
-                          <a:latin typeface="+mn-lt"/>
-                          <a:ea typeface="+mn-ea"/>
-                          <a:cs typeface="+mn-cs"/>
-                        </a:rPr>
-                        <a:t>Low</a:t>
-                      </a:r>
-                    </a:p>
-                  </a:txBody>
-                  <a:tcPr/>
-                </a:tc>
-                <a:tc>
-                  <a:txBody>
-                    <a:bodyPr/>
-                    <a:lstStyle/>
-                    <a:p>
-                      <a:pPr marL="0" marR="0" lvl="0" indent="0" algn="l" defTabSz="914400" rtl="0" eaLnBrk="1" fontAlgn="auto" latinLnBrk="0" hangingPunct="1">
-                        <a:lnSpc>
-                          <a:spcPct val="100000"/>
-                        </a:lnSpc>
-                        <a:spcBef>
-                          <a:spcPts val="0"/>
-                        </a:spcBef>
-                        <a:spcAft>
-                          <a:spcPts val="0"/>
-                        </a:spcAft>
-                        <a:buClrTx/>
-                        <a:buSzTx/>
-                        <a:buFont typeface="Wingdings" panose="05000000000000000000" pitchFamily="2" charset="2"/>
-                        <a:buNone/>
-                        <a:tabLst/>
-                        <a:defRPr/>
-                      </a:pPr>
-                      <a:r>
-                        <a:rPr kumimoji="0" lang="en-US" sz="1800" b="0" i="0" u="none" strike="noStrike" kern="1200" cap="none" spc="0" normalizeH="0" baseline="0" noProof="0" dirty="0">
-                          <a:ln>
-                            <a:noFill/>
-                          </a:ln>
-                          <a:solidFill>
-                            <a:srgbClr val="FF0000"/>
-                          </a:solidFill>
-                          <a:effectLst/>
-                          <a:uLnTx/>
-                          <a:uFillTx/>
-                          <a:latin typeface="+mn-lt"/>
-                          <a:ea typeface="+mn-ea"/>
-                          <a:cs typeface="+mn-cs"/>
-                        </a:rPr>
-                        <a:t>1</a:t>
-                      </a:r>
-                    </a:p>
-                  </a:txBody>
-                  <a:tcPr/>
-                </a:tc>
-                <a:extLst>
-                  <a:ext uri="{0D108BD9-81ED-4DB2-BD59-A6C34878D82A}">
-                    <a16:rowId xmlns:a16="http://schemas.microsoft.com/office/drawing/2014/main" val="3783122878"/>
-                  </a:ext>
-                </a:extLst>
-              </a:tr>
-            </a:tbl>
-          </a:graphicData>
-        </a:graphic>
-      </p:graphicFrame>
+        </p:nvPicPr>
+        <p:blipFill>
+          <a:blip r:embed="rId2">
+            <a:extLst>
+              <a:ext uri="{28A0092B-C50C-407E-A947-70E740481C1C}">
+                <a14:useLocalDpi xmlns:a14="http://schemas.microsoft.com/office/drawing/2010/main" val="0"/>
+              </a:ext>
+            </a:extLst>
+          </a:blip>
+          <a:stretch>
+            <a:fillRect/>
+          </a:stretch>
+        </p:blipFill>
+        <p:spPr>
+          <a:xfrm>
+            <a:off x="2768506" y="1825625"/>
+            <a:ext cx="6654987" cy="4351338"/>
+          </a:xfrm>
+        </p:spPr>
+      </p:pic>
     </p:spTree>
     <p:extLst>
       <p:ext uri="{BB962C8B-B14F-4D97-AF65-F5344CB8AC3E}">
@@ -17047,7 +16098,7 @@
             <p:ph idx="1"/>
             <p:extLst>
               <p:ext uri="{D42A27DB-BD31-4B8C-83A1-F6EECF244321}">
-                <p14:modId xmlns:p14="http://schemas.microsoft.com/office/powerpoint/2010/main" val="3425735376"/>
+                <p14:modId xmlns:p14="http://schemas.microsoft.com/office/powerpoint/2010/main" val="1461351312"/>
               </p:ext>
             </p:extLst>
           </p:nvPr>
@@ -17661,7 +16712,7 @@
                       </a:pPr>
                       <a:r>
                         <a:rPr lang="en-US" noProof="0" dirty="0"/>
-                        <a:t>PWM using servo lib</a:t>
+                        <a:t>PWM using servo lib pin 5</a:t>
                       </a:r>
                     </a:p>
                   </a:txBody>
@@ -17780,7 +16831,7 @@
                       </a:pPr>
                       <a:r>
                         <a:rPr lang="en-US" noProof="0" dirty="0"/>
-                        <a:t>PWM using servo lib</a:t>
+                        <a:t>PWM using servo lib pin 6</a:t>
                       </a:r>
                     </a:p>
                   </a:txBody>
@@ -17899,7 +16950,7 @@
                       </a:pPr>
                       <a:r>
                         <a:rPr lang="en-US" noProof="0" dirty="0"/>
-                        <a:t>PWM using servo lib</a:t>
+                        <a:t>PWM using servo lib pin 7</a:t>
                       </a:r>
                     </a:p>
                   </a:txBody>
@@ -18018,7 +17069,7 @@
                       </a:pPr>
                       <a:r>
                         <a:rPr lang="en-US" noProof="0" dirty="0"/>
-                        <a:t>PWM using servo lib</a:t>
+                        <a:t>PWM using servo lib pin 8</a:t>
                       </a:r>
                     </a:p>
                   </a:txBody>
@@ -18220,6 +17271,53 @@
             <a:r>
               <a:rPr lang="fr-FR" b="1" dirty="0"/>
               <a:t>largeur de 19mm</a:t>
+            </a:r>
+          </a:p>
+          <a:p>
+            <a:pPr marL="457200" lvl="1" indent="0">
+              <a:buNone/>
+            </a:pPr>
+            <a:endParaRPr lang="fr-FR" b="1" dirty="0"/>
+          </a:p>
+          <a:p>
+            <a:pPr marL="457200" lvl="1" indent="0">
+              <a:buNone/>
+            </a:pPr>
+            <a:r>
+              <a:rPr lang="fr-FR" b="1" dirty="0"/>
+              <a:t>But the frame has </a:t>
+            </a:r>
+            <a:r>
+              <a:rPr lang="fr-FR" b="1" dirty="0" err="1"/>
+              <a:t>reduced</a:t>
+            </a:r>
+            <a:r>
+              <a:rPr lang="fr-FR" b="1" dirty="0"/>
+              <a:t> </a:t>
+            </a:r>
+            <a:r>
+              <a:rPr lang="fr-FR" b="1" dirty="0" err="1"/>
+              <a:t>from</a:t>
+            </a:r>
+            <a:r>
+              <a:rPr lang="fr-FR" b="1"/>
+              <a:t> 10cm, </a:t>
+            </a:r>
+            <a:r>
+              <a:rPr lang="fr-FR" b="1" dirty="0"/>
+              <a:t>new </a:t>
+            </a:r>
+            <a:r>
+              <a:rPr lang="fr-FR" dirty="0"/>
+              <a:t>Largeur: </a:t>
+            </a:r>
+            <a:r>
+              <a:rPr lang="fr-FR" b="1" dirty="0"/>
+              <a:t>450mm</a:t>
+            </a:r>
+            <a:r>
+              <a:rPr lang="fr-FR" dirty="0"/>
+              <a:t> </a:t>
             </a:r>
             <a:endParaRPr lang="en-US" dirty="0"/>
           </a:p>
@@ -19958,7 +19056,7 @@
           <a:p>
             <a:r>
               <a:rPr lang="fr-FR" dirty="0"/>
-              <a:t>PWM</a:t>
+              <a:t>ESC PWM</a:t>
             </a:r>
             <a:endParaRPr lang="en-US" dirty="0"/>
           </a:p>
@@ -19995,7 +19093,7 @@
         </p:blipFill>
         <p:spPr bwMode="auto">
           <a:xfrm>
-            <a:off x="2412328" y="1825625"/>
+            <a:off x="2412328" y="2345578"/>
             <a:ext cx="7367344" cy="4351338"/>
           </a:xfrm>
           <a:prstGeom prst="rect">
@@ -20013,6 +19111,72 @@
           </a:extLst>
         </p:spPr>
       </p:pic>
+      <p:sp>
+        <p:nvSpPr>
+          <p:cNvPr id="4" name="ZoneTexte 3">
+            <a:extLst>
+              <a:ext uri="{FF2B5EF4-FFF2-40B4-BE49-F238E27FC236}">
+                <a16:creationId xmlns:a16="http://schemas.microsoft.com/office/drawing/2014/main" id="{1E92978D-D270-4B57-83C7-0C8B0B13DF7C}"/>
+              </a:ext>
+            </a:extLst>
+          </p:cNvPr>
+          <p:cNvSpPr txBox="1"/>
+          <p:nvPr/>
+        </p:nvSpPr>
+        <p:spPr>
+          <a:xfrm>
+            <a:off x="1515035" y="1622612"/>
+            <a:ext cx="5291128" cy="646331"/>
+          </a:xfrm>
+          <a:prstGeom prst="rect">
+            <a:avLst/>
+          </a:prstGeom>
+          <a:noFill/>
+        </p:spPr>
+        <p:txBody>
+          <a:bodyPr wrap="none" rtlCol="0">
+            <a:spAutoFit/>
+          </a:bodyPr>
+          <a:lstStyle/>
+          <a:p>
+            <a:r>
+              <a:rPr lang="fr-FR" dirty="0" err="1"/>
+              <a:t>Configured</a:t>
+            </a:r>
+            <a:r>
+              <a:rPr lang="fr-FR" dirty="0"/>
+              <a:t> </a:t>
+            </a:r>
+            <a:r>
+              <a:rPr lang="fr-FR" dirty="0" err="1"/>
+              <a:t>using</a:t>
+            </a:r>
+            <a:r>
+              <a:rPr lang="fr-FR" dirty="0"/>
+              <a:t> BHELI suite </a:t>
+            </a:r>
+            <a:r>
+              <a:rPr lang="fr-FR" dirty="0" err="1"/>
+              <a:t>with</a:t>
+            </a:r>
+            <a:r>
+              <a:rPr lang="fr-FR" dirty="0"/>
+              <a:t> a range 1148 - 1832.</a:t>
+            </a:r>
+          </a:p>
+          <a:p>
+            <a:r>
+              <a:rPr lang="fr-FR" dirty="0" err="1"/>
+              <a:t>Firmware</a:t>
+            </a:r>
+            <a:r>
+              <a:rPr lang="fr-FR" dirty="0"/>
+              <a:t> 16.6 GH30 </a:t>
+            </a:r>
+            <a:endParaRPr lang="en-US" dirty="0"/>
+          </a:p>
+        </p:txBody>
+      </p:sp>
     </p:spTree>
     <p:extLst>
       <p:ext uri="{BB962C8B-B14F-4D97-AF65-F5344CB8AC3E}">

</xml_diff>